<commit_message>
ptt - sprint 02
</commit_message>
<xml_diff>
--- a/Documentação/PPT-jobby-Jobs-sprint-02.pptx
+++ b/Documentação/PPT-jobby-Jobs-sprint-02.pptx
@@ -6,21 +6,23 @@
   </p:sldMasterIdLst>
   <p:sldIdLst>
     <p:sldId id="256" r:id="rId2"/>
-    <p:sldId id="257" r:id="rId3"/>
-    <p:sldId id="258" r:id="rId4"/>
+    <p:sldId id="258" r:id="rId3"/>
+    <p:sldId id="257" r:id="rId4"/>
     <p:sldId id="259" r:id="rId5"/>
     <p:sldId id="260" r:id="rId6"/>
     <p:sldId id="261" r:id="rId7"/>
-    <p:sldId id="263" r:id="rId8"/>
-    <p:sldId id="262" r:id="rId9"/>
-    <p:sldId id="264" r:id="rId10"/>
-    <p:sldId id="266" r:id="rId11"/>
-    <p:sldId id="267" r:id="rId12"/>
-    <p:sldId id="268" r:id="rId13"/>
-    <p:sldId id="269" r:id="rId14"/>
-    <p:sldId id="271" r:id="rId15"/>
-    <p:sldId id="272" r:id="rId16"/>
-    <p:sldId id="270" r:id="rId17"/>
+    <p:sldId id="274" r:id="rId8"/>
+    <p:sldId id="263" r:id="rId9"/>
+    <p:sldId id="262" r:id="rId10"/>
+    <p:sldId id="264" r:id="rId11"/>
+    <p:sldId id="266" r:id="rId12"/>
+    <p:sldId id="267" r:id="rId13"/>
+    <p:sldId id="268" r:id="rId14"/>
+    <p:sldId id="272" r:id="rId15"/>
+    <p:sldId id="269" r:id="rId16"/>
+    <p:sldId id="273" r:id="rId17"/>
+    <p:sldId id="271" r:id="rId18"/>
+    <p:sldId id="270" r:id="rId19"/>
   </p:sldIdLst>
   <p:sldSz cx="12192000" cy="6858000"/>
   <p:notesSz cx="6858000" cy="9144000"/>
@@ -3457,46 +3459,19 @@
           <a:chExt cx="0" cy="0"/>
         </a:xfrm>
       </p:grpSpPr>
-      <p:sp>
-        <p:nvSpPr>
-          <p:cNvPr id="2" name="Título 1">
-            <a:extLst>
-              <a:ext uri="{FF2B5EF4-FFF2-40B4-BE49-F238E27FC236}">
-                <a16:creationId xmlns:a16="http://schemas.microsoft.com/office/drawing/2014/main" id="{4622AFBF-55F7-49CC-BEB8-66153DD14F16}"/>
-              </a:ext>
-            </a:extLst>
-          </p:cNvPr>
-          <p:cNvSpPr>
-            <a:spLocks noGrp="1"/>
-          </p:cNvSpPr>
-          <p:nvPr>
-            <p:ph type="title"/>
-          </p:nvPr>
-        </p:nvSpPr>
-        <p:spPr/>
-        <p:txBody>
-          <a:bodyPr/>
-          <a:lstStyle/>
-          <a:p>
-            <a:endParaRPr lang="pt-BR"/>
-          </a:p>
-        </p:txBody>
-      </p:sp>
       <p:pic>
         <p:nvPicPr>
-          <p:cNvPr id="7" name="Espaço Reservado para Conteúdo 6" descr="Uma imagem contendo Interface gráfica do usuário&#10;&#10;Descrição gerada automaticamente">
-            <a:extLst>
-              <a:ext uri="{FF2B5EF4-FFF2-40B4-BE49-F238E27FC236}">
-                <a16:creationId xmlns:a16="http://schemas.microsoft.com/office/drawing/2014/main" id="{2A9033E1-18DC-49E9-8295-E85B794EF550}"/>
+          <p:cNvPr id="7" name="Imagem 6" descr="Uma imagem contendo Interface gráfica do usuário, Texto&#10;&#10;Descrição gerada automaticamente">
+            <a:extLst>
+              <a:ext uri="{FF2B5EF4-FFF2-40B4-BE49-F238E27FC236}">
+                <a16:creationId xmlns:a16="http://schemas.microsoft.com/office/drawing/2014/main" id="{64D6CDF5-ADD0-462D-9BA5-B1587E2E9E45}"/>
               </a:ext>
             </a:extLst>
           </p:cNvPr>
           <p:cNvPicPr>
-            <a:picLocks noGrp="1" noChangeAspect="1"/>
+            <a:picLocks noChangeAspect="1"/>
           </p:cNvPicPr>
-          <p:nvPr>
-            <p:ph idx="1"/>
-          </p:nvPr>
+          <p:nvPr/>
         </p:nvPicPr>
         <p:blipFill>
           <a:blip r:embed="rId2">
@@ -3512,17 +3487,20 @@
         </p:blipFill>
         <p:spPr>
           <a:xfrm>
-            <a:off x="0" y="-365126"/>
-            <a:ext cx="12192000" cy="7223125"/>
-          </a:xfrm>
+            <a:off x="0" y="-265439"/>
+            <a:ext cx="12192000" cy="6858000"/>
+          </a:xfrm>
+          <a:prstGeom prst="rect">
+            <a:avLst/>
+          </a:prstGeom>
         </p:spPr>
       </p:pic>
       <p:pic>
         <p:nvPicPr>
-          <p:cNvPr id="11" name="Imagem 10">
-            <a:extLst>
-              <a:ext uri="{FF2B5EF4-FFF2-40B4-BE49-F238E27FC236}">
-                <a16:creationId xmlns:a16="http://schemas.microsoft.com/office/drawing/2014/main" id="{23CA71CF-1A17-4A00-82A2-926173965E95}"/>
+          <p:cNvPr id="3" name="Imagem 2">
+            <a:extLst>
+              <a:ext uri="{FF2B5EF4-FFF2-40B4-BE49-F238E27FC236}">
+                <a16:creationId xmlns:a16="http://schemas.microsoft.com/office/drawing/2014/main" id="{467D1F7D-B842-4680-96A2-C9CB4E1D1A9A}"/>
               </a:ext>
             </a:extLst>
           </p:cNvPr>
@@ -3531,76 +3509,15 @@
           </p:cNvPicPr>
           <p:nvPr/>
         </p:nvPicPr>
-        <p:blipFill>
+        <p:blipFill rotWithShape="1">
           <a:blip r:embed="rId3"/>
-          <a:stretch>
-            <a:fillRect/>
-          </a:stretch>
+          <a:srcRect l="1133" t="1892" r="1529"/>
+          <a:stretch/>
         </p:blipFill>
         <p:spPr>
           <a:xfrm>
-            <a:off x="54820" y="1176299"/>
-            <a:ext cx="5995307" cy="3272871"/>
-          </a:xfrm>
-          <a:prstGeom prst="rect">
-            <a:avLst/>
-          </a:prstGeom>
-        </p:spPr>
-      </p:pic>
-      <p:pic>
-        <p:nvPicPr>
-          <p:cNvPr id="13" name="Imagem 12">
-            <a:extLst>
-              <a:ext uri="{FF2B5EF4-FFF2-40B4-BE49-F238E27FC236}">
-                <a16:creationId xmlns:a16="http://schemas.microsoft.com/office/drawing/2014/main" id="{76E9F895-35DF-4F91-BA22-B443118D5CFD}"/>
-              </a:ext>
-            </a:extLst>
-          </p:cNvPr>
-          <p:cNvPicPr>
-            <a:picLocks noChangeAspect="1"/>
-          </p:cNvPicPr>
-          <p:nvPr/>
-        </p:nvPicPr>
-        <p:blipFill>
-          <a:blip r:embed="rId4"/>
-          <a:stretch>
-            <a:fillRect/>
-          </a:stretch>
-        </p:blipFill>
-        <p:spPr>
-          <a:xfrm>
-            <a:off x="6050127" y="1485975"/>
-            <a:ext cx="5983836" cy="2493265"/>
-          </a:xfrm>
-          <a:prstGeom prst="rect">
-            <a:avLst/>
-          </a:prstGeom>
-        </p:spPr>
-      </p:pic>
-      <p:pic>
-        <p:nvPicPr>
-          <p:cNvPr id="17" name="Imagem 16">
-            <a:extLst>
-              <a:ext uri="{FF2B5EF4-FFF2-40B4-BE49-F238E27FC236}">
-                <a16:creationId xmlns:a16="http://schemas.microsoft.com/office/drawing/2014/main" id="{48D8ABEC-9FEF-4519-BD23-B686E458FDB6}"/>
-              </a:ext>
-            </a:extLst>
-          </p:cNvPr>
-          <p:cNvPicPr>
-            <a:picLocks noChangeAspect="1"/>
-          </p:cNvPicPr>
-          <p:nvPr/>
-        </p:nvPicPr>
-        <p:blipFill>
-          <a:blip r:embed="rId5"/>
-          <a:stretch>
-            <a:fillRect/>
-          </a:stretch>
-        </p:blipFill>
-        <p:spPr>
-          <a:xfrm>
-            <a:off x="6141875" y="3912935"/>
-            <a:ext cx="5892088" cy="2121175"/>
+            <a:off x="2597426" y="1035252"/>
+            <a:ext cx="6016487" cy="5557309"/>
           </a:xfrm>
           <a:prstGeom prst="rect">
             <a:avLst/>
@@ -3610,7 +3527,7 @@
     </p:spTree>
     <p:extLst>
       <p:ext uri="{BB962C8B-B14F-4D97-AF65-F5344CB8AC3E}">
-        <p14:creationId xmlns:p14="http://schemas.microsoft.com/office/powerpoint/2010/main" val="1946067632"/>
+        <p14:creationId xmlns:p14="http://schemas.microsoft.com/office/powerpoint/2010/main" val="395785051"/>
       </p:ext>
     </p:extLst>
   </p:cSld>
@@ -3642,7 +3559,7 @@
           <p:cNvPr id="2" name="Título 1">
             <a:extLst>
               <a:ext uri="{FF2B5EF4-FFF2-40B4-BE49-F238E27FC236}">
-                <a16:creationId xmlns:a16="http://schemas.microsoft.com/office/drawing/2014/main" id="{BD3C90A3-2265-4735-BE78-5F714580126A}"/>
+                <a16:creationId xmlns:a16="http://schemas.microsoft.com/office/drawing/2014/main" id="{4622AFBF-55F7-49CC-BEB8-66153DD14F16}"/>
               </a:ext>
             </a:extLst>
           </p:cNvPr>
@@ -3664,10 +3581,10 @@
       </p:sp>
       <p:pic>
         <p:nvPicPr>
-          <p:cNvPr id="5" name="Espaço Reservado para Conteúdo 4" descr="Uma imagem contendo Diagrama&#10;&#10;Descrição gerada automaticamente">
-            <a:extLst>
-              <a:ext uri="{FF2B5EF4-FFF2-40B4-BE49-F238E27FC236}">
-                <a16:creationId xmlns:a16="http://schemas.microsoft.com/office/drawing/2014/main" id="{B7F6659F-62E0-4411-8941-159B6E3B1337}"/>
+          <p:cNvPr id="7" name="Espaço Reservado para Conteúdo 6" descr="Uma imagem contendo Interface gráfica do usuário&#10;&#10;Descrição gerada automaticamente">
+            <a:extLst>
+              <a:ext uri="{FF2B5EF4-FFF2-40B4-BE49-F238E27FC236}">
+                <a16:creationId xmlns:a16="http://schemas.microsoft.com/office/drawing/2014/main" id="{2A9033E1-18DC-49E9-8295-E85B794EF550}"/>
               </a:ext>
             </a:extLst>
           </p:cNvPr>
@@ -3692,15 +3609,105 @@
         </p:blipFill>
         <p:spPr>
           <a:xfrm>
-            <a:off x="0" y="0"/>
-            <a:ext cx="12192000" cy="6858000"/>
-          </a:xfrm>
+            <a:off x="0" y="-351874"/>
+            <a:ext cx="12192000" cy="7223125"/>
+          </a:xfrm>
+        </p:spPr>
+      </p:pic>
+      <p:pic>
+        <p:nvPicPr>
+          <p:cNvPr id="4" name="Imagem 3">
+            <a:extLst>
+              <a:ext uri="{FF2B5EF4-FFF2-40B4-BE49-F238E27FC236}">
+                <a16:creationId xmlns:a16="http://schemas.microsoft.com/office/drawing/2014/main" id="{21557A52-A206-4D28-93BD-D7A1C312A0EB}"/>
+              </a:ext>
+            </a:extLst>
+          </p:cNvPr>
+          <p:cNvPicPr>
+            <a:picLocks noChangeAspect="1"/>
+          </p:cNvPicPr>
+          <p:nvPr/>
+        </p:nvPicPr>
+        <p:blipFill>
+          <a:blip r:embed="rId3"/>
+          <a:stretch>
+            <a:fillRect/>
+          </a:stretch>
+        </p:blipFill>
+        <p:spPr>
+          <a:xfrm>
+            <a:off x="213408" y="1200186"/>
+            <a:ext cx="5988171" cy="3120024"/>
+          </a:xfrm>
+          <a:prstGeom prst="rect">
+            <a:avLst/>
+          </a:prstGeom>
+        </p:spPr>
+      </p:pic>
+      <p:pic>
+        <p:nvPicPr>
+          <p:cNvPr id="6" name="Imagem 5">
+            <a:extLst>
+              <a:ext uri="{FF2B5EF4-FFF2-40B4-BE49-F238E27FC236}">
+                <a16:creationId xmlns:a16="http://schemas.microsoft.com/office/drawing/2014/main" id="{7838F7F2-532D-4E00-8ADA-5CFFD1A34AF3}"/>
+              </a:ext>
+            </a:extLst>
+          </p:cNvPr>
+          <p:cNvPicPr>
+            <a:picLocks noChangeAspect="1"/>
+          </p:cNvPicPr>
+          <p:nvPr/>
+        </p:nvPicPr>
+        <p:blipFill>
+          <a:blip r:embed="rId4"/>
+          <a:stretch>
+            <a:fillRect/>
+          </a:stretch>
+        </p:blipFill>
+        <p:spPr>
+          <a:xfrm>
+            <a:off x="6185537" y="1568106"/>
+            <a:ext cx="5793055" cy="2231219"/>
+          </a:xfrm>
+          <a:prstGeom prst="rect">
+            <a:avLst/>
+          </a:prstGeom>
+        </p:spPr>
+      </p:pic>
+      <p:pic>
+        <p:nvPicPr>
+          <p:cNvPr id="9" name="Imagem 8">
+            <a:extLst>
+              <a:ext uri="{FF2B5EF4-FFF2-40B4-BE49-F238E27FC236}">
+                <a16:creationId xmlns:a16="http://schemas.microsoft.com/office/drawing/2014/main" id="{E0DB2908-01DA-48F3-B224-381D4815670E}"/>
+              </a:ext>
+            </a:extLst>
+          </p:cNvPr>
+          <p:cNvPicPr>
+            <a:picLocks noChangeAspect="1"/>
+          </p:cNvPicPr>
+          <p:nvPr/>
+        </p:nvPicPr>
+        <p:blipFill>
+          <a:blip r:embed="rId5"/>
+          <a:stretch>
+            <a:fillRect/>
+          </a:stretch>
+        </p:blipFill>
+        <p:spPr>
+          <a:xfrm>
+            <a:off x="6201579" y="3836115"/>
+            <a:ext cx="5777013" cy="1694553"/>
+          </a:xfrm>
+          <a:prstGeom prst="rect">
+            <a:avLst/>
+          </a:prstGeom>
         </p:spPr>
       </p:pic>
     </p:spTree>
     <p:extLst>
       <p:ext uri="{BB962C8B-B14F-4D97-AF65-F5344CB8AC3E}">
-        <p14:creationId xmlns:p14="http://schemas.microsoft.com/office/powerpoint/2010/main" val="2544481467"/>
+        <p14:creationId xmlns:p14="http://schemas.microsoft.com/office/powerpoint/2010/main" val="1946067632"/>
       </p:ext>
     </p:extLst>
   </p:cSld>
@@ -3732,7 +3739,7 @@
           <p:cNvPr id="2" name="Título 1">
             <a:extLst>
               <a:ext uri="{FF2B5EF4-FFF2-40B4-BE49-F238E27FC236}">
-                <a16:creationId xmlns:a16="http://schemas.microsoft.com/office/drawing/2014/main" id="{B1C6B988-BD9C-49DA-8BDA-8BC09E48176F}"/>
+                <a16:creationId xmlns:a16="http://schemas.microsoft.com/office/drawing/2014/main" id="{BD3C90A3-2265-4735-BE78-5F714580126A}"/>
               </a:ext>
             </a:extLst>
           </p:cNvPr>
@@ -3754,10 +3761,10 @@
       </p:sp>
       <p:pic>
         <p:nvPicPr>
-          <p:cNvPr id="5" name="Espaço Reservado para Conteúdo 4" descr="Interface gráfica do usuário, Texto&#10;&#10;Descrição gerada automaticamente">
-            <a:extLst>
-              <a:ext uri="{FF2B5EF4-FFF2-40B4-BE49-F238E27FC236}">
-                <a16:creationId xmlns:a16="http://schemas.microsoft.com/office/drawing/2014/main" id="{E2154351-4199-45BD-AA23-AC95EDCA79E3}"/>
+          <p:cNvPr id="5" name="Espaço Reservado para Conteúdo 4" descr="Uma imagem contendo Diagrama&#10;&#10;Descrição gerada automaticamente">
+            <a:extLst>
+              <a:ext uri="{FF2B5EF4-FFF2-40B4-BE49-F238E27FC236}">
+                <a16:creationId xmlns:a16="http://schemas.microsoft.com/office/drawing/2014/main" id="{B7F6659F-62E0-4411-8941-159B6E3B1337}"/>
               </a:ext>
             </a:extLst>
           </p:cNvPr>
@@ -3790,7 +3797,7 @@
     </p:spTree>
     <p:extLst>
       <p:ext uri="{BB962C8B-B14F-4D97-AF65-F5344CB8AC3E}">
-        <p14:creationId xmlns:p14="http://schemas.microsoft.com/office/powerpoint/2010/main" val="971893869"/>
+        <p14:creationId xmlns:p14="http://schemas.microsoft.com/office/powerpoint/2010/main" val="2544481467"/>
       </p:ext>
     </p:extLst>
   </p:cSld>
@@ -3819,35 +3826,59 @@
       </p:grpSpPr>
       <p:sp>
         <p:nvSpPr>
-          <p:cNvPr id="2" name="Título 1">
-            <a:extLst>
-              <a:ext uri="{FF2B5EF4-FFF2-40B4-BE49-F238E27FC236}">
-                <a16:creationId xmlns:a16="http://schemas.microsoft.com/office/drawing/2014/main" id="{354B7E7D-4316-4DC6-8096-A63C8E68F960}"/>
-              </a:ext>
-            </a:extLst>
-          </p:cNvPr>
-          <p:cNvSpPr>
-            <a:spLocks noGrp="1"/>
-          </p:cNvSpPr>
-          <p:nvPr>
-            <p:ph type="title"/>
-          </p:nvPr>
-        </p:nvSpPr>
-        <p:spPr/>
-        <p:txBody>
-          <a:bodyPr/>
-          <a:lstStyle/>
-          <a:p>
-            <a:endParaRPr lang="pt-BR"/>
+          <p:cNvPr id="6" name="Retângulo 5">
+            <a:extLst>
+              <a:ext uri="{FF2B5EF4-FFF2-40B4-BE49-F238E27FC236}">
+                <a16:creationId xmlns:a16="http://schemas.microsoft.com/office/drawing/2014/main" id="{86757FEC-0125-413F-A22E-57BA0ED30A9D}"/>
+              </a:ext>
+            </a:extLst>
+          </p:cNvPr>
+          <p:cNvSpPr/>
+          <p:nvPr/>
+        </p:nvSpPr>
+        <p:spPr>
+          <a:xfrm>
+            <a:off x="-622852" y="0"/>
+            <a:ext cx="12814852" cy="6858000"/>
+          </a:xfrm>
+          <a:prstGeom prst="rect">
+            <a:avLst/>
+          </a:prstGeom>
+          <a:solidFill>
+            <a:srgbClr val="F1E5D7"/>
+          </a:solidFill>
+        </p:spPr>
+        <p:style>
+          <a:lnRef idx="2">
+            <a:schemeClr val="accent1">
+              <a:shade val="50000"/>
+            </a:schemeClr>
+          </a:lnRef>
+          <a:fillRef idx="1">
+            <a:schemeClr val="accent1"/>
+          </a:fillRef>
+          <a:effectRef idx="0">
+            <a:schemeClr val="accent1"/>
+          </a:effectRef>
+          <a:fontRef idx="minor">
+            <a:schemeClr val="lt1"/>
+          </a:fontRef>
+        </p:style>
+        <p:txBody>
+          <a:bodyPr rtlCol="0" anchor="ctr"/>
+          <a:lstStyle/>
+          <a:p>
+            <a:pPr algn="ctr"/>
+            <a:endParaRPr lang="pt-BR" dirty="0"/>
           </a:p>
         </p:txBody>
       </p:sp>
       <p:pic>
         <p:nvPicPr>
-          <p:cNvPr id="9" name="Espaço Reservado para Conteúdo 8" descr="Uma imagem contendo Texto&#10;&#10;Descrição gerada automaticamente">
-            <a:extLst>
-              <a:ext uri="{FF2B5EF4-FFF2-40B4-BE49-F238E27FC236}">
-                <a16:creationId xmlns:a16="http://schemas.microsoft.com/office/drawing/2014/main" id="{6FFF1BB7-9A46-42F1-8F75-8EBDDE23E140}"/>
+          <p:cNvPr id="7" name="Espaço Reservado para Conteúdo 4" descr="Interface gráfica do usuário, Texto&#10;&#10;Descrição gerada automaticamente">
+            <a:extLst>
+              <a:ext uri="{FF2B5EF4-FFF2-40B4-BE49-F238E27FC236}">
+                <a16:creationId xmlns:a16="http://schemas.microsoft.com/office/drawing/2014/main" id="{250A39A7-619F-4063-B915-7096A53F7704}"/>
               </a:ext>
             </a:extLst>
           </p:cNvPr>
@@ -3872,15 +3903,18 @@
         </p:blipFill>
         <p:spPr>
           <a:xfrm>
-            <a:off x="0" y="0"/>
-            <a:ext cx="12192000" cy="6858000"/>
-          </a:xfrm>
+            <a:off x="662609" y="0"/>
+            <a:ext cx="10866782" cy="6858000"/>
+          </a:xfrm>
+          <a:solidFill>
+            <a:srgbClr val="F1E5D7"/>
+          </a:solidFill>
         </p:spPr>
       </p:pic>
     </p:spTree>
     <p:extLst>
       <p:ext uri="{BB962C8B-B14F-4D97-AF65-F5344CB8AC3E}">
-        <p14:creationId xmlns:p14="http://schemas.microsoft.com/office/powerpoint/2010/main" val="1316381145"/>
+        <p14:creationId xmlns:p14="http://schemas.microsoft.com/office/powerpoint/2010/main" val="971893869"/>
       </p:ext>
     </p:extLst>
   </p:cSld>
@@ -3912,7 +3946,7 @@
           <p:cNvPr id="2" name="Título 1">
             <a:extLst>
               <a:ext uri="{FF2B5EF4-FFF2-40B4-BE49-F238E27FC236}">
-                <a16:creationId xmlns:a16="http://schemas.microsoft.com/office/drawing/2014/main" id="{5D41A5CF-35E0-4139-8E6C-1EA5644FC5A5}"/>
+                <a16:creationId xmlns:a16="http://schemas.microsoft.com/office/drawing/2014/main" id="{C2DF2220-4103-44AC-90D1-65F344D103BF}"/>
               </a:ext>
             </a:extLst>
           </p:cNvPr>
@@ -3934,10 +3968,11 @@
       </p:sp>
       <p:pic>
         <p:nvPicPr>
-          <p:cNvPr id="5" name="Espaço Reservado para Conteúdo 4" descr="Uma imagem contendo Texto&#10;&#10;Descrição gerada automaticamente">
-            <a:extLst>
-              <a:ext uri="{FF2B5EF4-FFF2-40B4-BE49-F238E27FC236}">
-                <a16:creationId xmlns:a16="http://schemas.microsoft.com/office/drawing/2014/main" id="{B72C02ED-851D-454B-8CF8-A4E978EA2D98}"/>
+          <p:cNvPr id="9" name="Espaço Reservado para Conteúdo 8" descr="Uma imagem contendo Interface gráfica do usuário, Texto&#10;&#10;Descrição gerada automaticamente">
+            <a:hlinkClick r:id="rId2"/>
+            <a:extLst>
+              <a:ext uri="{FF2B5EF4-FFF2-40B4-BE49-F238E27FC236}">
+                <a16:creationId xmlns:a16="http://schemas.microsoft.com/office/drawing/2014/main" id="{217D9129-E762-4AB7-B919-5435052C801A}"/>
               </a:ext>
             </a:extLst>
           </p:cNvPr>
@@ -3949,7 +3984,7 @@
           </p:nvPr>
         </p:nvPicPr>
         <p:blipFill>
-          <a:blip r:embed="rId2">
+          <a:blip r:embed="rId3">
             <a:extLst>
               <a:ext uri="{28A0092B-C50C-407E-A947-70E740481C1C}">
                 <a14:useLocalDpi xmlns:a14="http://schemas.microsoft.com/office/drawing/2010/main" val="0"/>
@@ -3962,15 +3997,120 @@
         </p:blipFill>
         <p:spPr>
           <a:xfrm>
-            <a:off x="0" y="154745"/>
+            <a:off x="-92766" y="0"/>
             <a:ext cx="12192000" cy="6858000"/>
           </a:xfrm>
         </p:spPr>
       </p:pic>
+      <p:sp>
+        <p:nvSpPr>
+          <p:cNvPr id="10" name="CaixaDeTexto 9">
+            <a:extLst>
+              <a:ext uri="{FF2B5EF4-FFF2-40B4-BE49-F238E27FC236}">
+                <a16:creationId xmlns:a16="http://schemas.microsoft.com/office/drawing/2014/main" id="{E9C9636D-023F-467B-8044-4685A2DF839F}"/>
+              </a:ext>
+            </a:extLst>
+          </p:cNvPr>
+          <p:cNvSpPr txBox="1"/>
+          <p:nvPr/>
+        </p:nvSpPr>
+        <p:spPr>
+          <a:xfrm>
+            <a:off x="1391478" y="2187474"/>
+            <a:ext cx="5897217" cy="369332"/>
+          </a:xfrm>
+          <a:prstGeom prst="rect">
+            <a:avLst/>
+          </a:prstGeom>
+          <a:noFill/>
+        </p:spPr>
+        <p:txBody>
+          <a:bodyPr wrap="square" rtlCol="0">
+            <a:spAutoFit/>
+          </a:bodyPr>
+          <a:lstStyle/>
+          <a:p>
+            <a:r>
+              <a:rPr lang="pt-BR" dirty="0"/>
+              <a:t>https://github.com/BandTec/20201-3adsa-grupo9</a:t>
+            </a:r>
+          </a:p>
+        </p:txBody>
+      </p:sp>
+      <p:sp>
+        <p:nvSpPr>
+          <p:cNvPr id="12" name="CaixaDeTexto 11">
+            <a:extLst>
+              <a:ext uri="{FF2B5EF4-FFF2-40B4-BE49-F238E27FC236}">
+                <a16:creationId xmlns:a16="http://schemas.microsoft.com/office/drawing/2014/main" id="{9FD37278-43A8-44BC-9233-9CD97500BB80}"/>
+              </a:ext>
+            </a:extLst>
+          </p:cNvPr>
+          <p:cNvSpPr txBox="1"/>
+          <p:nvPr/>
+        </p:nvSpPr>
+        <p:spPr>
+          <a:xfrm>
+            <a:off x="1391477" y="3656619"/>
+            <a:ext cx="8998227" cy="369332"/>
+          </a:xfrm>
+          <a:prstGeom prst="rect">
+            <a:avLst/>
+          </a:prstGeom>
+          <a:noFill/>
+        </p:spPr>
+        <p:txBody>
+          <a:bodyPr wrap="square" rtlCol="0">
+            <a:spAutoFit/>
+          </a:bodyPr>
+          <a:lstStyle/>
+          <a:p>
+            <a:r>
+              <a:rPr lang="pt-BR" dirty="0"/>
+              <a:t>https://www.figma.com/file/afkGIVHP6K6WnsOdMm1XDG/Jobby-Jobs?node-id=526%3A0</a:t>
+            </a:r>
+          </a:p>
+        </p:txBody>
+      </p:sp>
+      <p:sp>
+        <p:nvSpPr>
+          <p:cNvPr id="14" name="CaixaDeTexto 13">
+            <a:extLst>
+              <a:ext uri="{FF2B5EF4-FFF2-40B4-BE49-F238E27FC236}">
+                <a16:creationId xmlns:a16="http://schemas.microsoft.com/office/drawing/2014/main" id="{422097A4-1078-4727-8752-27FA0CED0E01}"/>
+              </a:ext>
+            </a:extLst>
+          </p:cNvPr>
+          <p:cNvSpPr txBox="1"/>
+          <p:nvPr/>
+        </p:nvSpPr>
+        <p:spPr>
+          <a:xfrm>
+            <a:off x="1391476" y="4941098"/>
+            <a:ext cx="8998227" cy="646331"/>
+          </a:xfrm>
+          <a:prstGeom prst="rect">
+            <a:avLst/>
+          </a:prstGeom>
+          <a:noFill/>
+        </p:spPr>
+        <p:txBody>
+          <a:bodyPr wrap="square" rtlCol="0">
+            <a:spAutoFit/>
+          </a:bodyPr>
+          <a:lstStyle/>
+          <a:p>
+            <a:r>
+              <a:rPr lang="pt-BR" dirty="0"/>
+              <a:t>https://tasks.office.com/bandtec.com.br/Home/PlanViews/YJ8lhO2180mamIlaZWr12WQAF5kJ?Type=PlanLink&amp;Channel=Link&amp;CreatedTime=637393149140190000</a:t>
+            </a:r>
+          </a:p>
+        </p:txBody>
+      </p:sp>
     </p:spTree>
     <p:extLst>
       <p:ext uri="{BB962C8B-B14F-4D97-AF65-F5344CB8AC3E}">
-        <p14:creationId xmlns:p14="http://schemas.microsoft.com/office/powerpoint/2010/main" val="4101122860"/>
+        <p14:creationId xmlns:p14="http://schemas.microsoft.com/office/powerpoint/2010/main" val="557324237"/>
       </p:ext>
     </p:extLst>
   </p:cSld>
@@ -4002,7 +4142,7 @@
           <p:cNvPr id="2" name="Título 1">
             <a:extLst>
               <a:ext uri="{FF2B5EF4-FFF2-40B4-BE49-F238E27FC236}">
-                <a16:creationId xmlns:a16="http://schemas.microsoft.com/office/drawing/2014/main" id="{C2DF2220-4103-44AC-90D1-65F344D103BF}"/>
+                <a16:creationId xmlns:a16="http://schemas.microsoft.com/office/drawing/2014/main" id="{354B7E7D-4316-4DC6-8096-A63C8E68F960}"/>
               </a:ext>
             </a:extLst>
           </p:cNvPr>
@@ -4022,35 +4162,45 @@
           </a:p>
         </p:txBody>
       </p:sp>
-      <p:sp>
-        <p:nvSpPr>
-          <p:cNvPr id="3" name="Espaço Reservado para Conteúdo 2">
-            <a:extLst>
-              <a:ext uri="{FF2B5EF4-FFF2-40B4-BE49-F238E27FC236}">
-                <a16:creationId xmlns:a16="http://schemas.microsoft.com/office/drawing/2014/main" id="{35574B15-2199-46A6-8150-AB77414EAF4F}"/>
-              </a:ext>
-            </a:extLst>
-          </p:cNvPr>
-          <p:cNvSpPr>
-            <a:spLocks noGrp="1"/>
-          </p:cNvSpPr>
+      <p:pic>
+        <p:nvPicPr>
+          <p:cNvPr id="9" name="Espaço Reservado para Conteúdo 8" descr="Uma imagem contendo Texto&#10;&#10;Descrição gerada automaticamente">
+            <a:extLst>
+              <a:ext uri="{FF2B5EF4-FFF2-40B4-BE49-F238E27FC236}">
+                <a16:creationId xmlns:a16="http://schemas.microsoft.com/office/drawing/2014/main" id="{6FFF1BB7-9A46-42F1-8F75-8EBDDE23E140}"/>
+              </a:ext>
+            </a:extLst>
+          </p:cNvPr>
+          <p:cNvPicPr>
+            <a:picLocks noGrp="1" noChangeAspect="1"/>
+          </p:cNvPicPr>
           <p:nvPr>
             <p:ph idx="1"/>
           </p:nvPr>
-        </p:nvSpPr>
-        <p:spPr/>
-        <p:txBody>
-          <a:bodyPr/>
-          <a:lstStyle/>
-          <a:p>
-            <a:endParaRPr lang="pt-BR"/>
-          </a:p>
-        </p:txBody>
-      </p:sp>
+        </p:nvPicPr>
+        <p:blipFill>
+          <a:blip r:embed="rId2">
+            <a:extLst>
+              <a:ext uri="{28A0092B-C50C-407E-A947-70E740481C1C}">
+                <a14:useLocalDpi xmlns:a14="http://schemas.microsoft.com/office/drawing/2010/main" val="0"/>
+              </a:ext>
+            </a:extLst>
+          </a:blip>
+          <a:stretch>
+            <a:fillRect/>
+          </a:stretch>
+        </p:blipFill>
+        <p:spPr>
+          <a:xfrm>
+            <a:off x="0" y="0"/>
+            <a:ext cx="12192000" cy="6858000"/>
+          </a:xfrm>
+        </p:spPr>
+      </p:pic>
     </p:spTree>
     <p:extLst>
       <p:ext uri="{BB962C8B-B14F-4D97-AF65-F5344CB8AC3E}">
-        <p14:creationId xmlns:p14="http://schemas.microsoft.com/office/powerpoint/2010/main" val="557324237"/>
+        <p14:creationId xmlns:p14="http://schemas.microsoft.com/office/powerpoint/2010/main" val="1316381145"/>
       </p:ext>
     </p:extLst>
   </p:cSld>
@@ -4082,6 +4232,186 @@
           <p:cNvPr id="2" name="Título 1">
             <a:extLst>
               <a:ext uri="{FF2B5EF4-FFF2-40B4-BE49-F238E27FC236}">
+                <a16:creationId xmlns:a16="http://schemas.microsoft.com/office/drawing/2014/main" id="{11172D57-4C8A-467F-AB1B-EE022AD23711}"/>
+              </a:ext>
+            </a:extLst>
+          </p:cNvPr>
+          <p:cNvSpPr>
+            <a:spLocks noGrp="1"/>
+          </p:cNvSpPr>
+          <p:nvPr>
+            <p:ph type="title"/>
+          </p:nvPr>
+        </p:nvSpPr>
+        <p:spPr/>
+        <p:txBody>
+          <a:bodyPr/>
+          <a:lstStyle/>
+          <a:p>
+            <a:endParaRPr lang="pt-BR"/>
+          </a:p>
+        </p:txBody>
+      </p:sp>
+      <p:pic>
+        <p:nvPicPr>
+          <p:cNvPr id="5" name="Espaço Reservado para Conteúdo 4" descr="Diagrama&#10;&#10;Descrição gerada automaticamente">
+            <a:extLst>
+              <a:ext uri="{FF2B5EF4-FFF2-40B4-BE49-F238E27FC236}">
+                <a16:creationId xmlns:a16="http://schemas.microsoft.com/office/drawing/2014/main" id="{E3206CD7-3212-46C5-A380-A1BC6651EE73}"/>
+              </a:ext>
+            </a:extLst>
+          </p:cNvPr>
+          <p:cNvPicPr>
+            <a:picLocks noGrp="1" noChangeAspect="1"/>
+          </p:cNvPicPr>
+          <p:nvPr>
+            <p:ph idx="1"/>
+          </p:nvPr>
+        </p:nvPicPr>
+        <p:blipFill>
+          <a:blip r:embed="rId2">
+            <a:extLst>
+              <a:ext uri="{28A0092B-C50C-407E-A947-70E740481C1C}">
+                <a14:useLocalDpi xmlns:a14="http://schemas.microsoft.com/office/drawing/2010/main" val="0"/>
+              </a:ext>
+            </a:extLst>
+          </a:blip>
+          <a:stretch>
+            <a:fillRect/>
+          </a:stretch>
+        </p:blipFill>
+        <p:spPr>
+          <a:xfrm>
+            <a:off x="0" y="0"/>
+            <a:ext cx="12192000" cy="6858000"/>
+          </a:xfrm>
+        </p:spPr>
+      </p:pic>
+    </p:spTree>
+    <p:extLst>
+      <p:ext uri="{BB962C8B-B14F-4D97-AF65-F5344CB8AC3E}">
+        <p14:creationId xmlns:p14="http://schemas.microsoft.com/office/powerpoint/2010/main" val="3840040263"/>
+      </p:ext>
+    </p:extLst>
+  </p:cSld>
+  <p:clrMapOvr>
+    <a:masterClrMapping/>
+  </p:clrMapOvr>
+</p:sld>
+</file>
+
+<file path=ppt/slides/slide17.xml><?xml version="1.0" encoding="utf-8"?>
+<p:sld xmlns:a="http://schemas.openxmlformats.org/drawingml/2006/main" xmlns:r="http://schemas.openxmlformats.org/officeDocument/2006/relationships" xmlns:p="http://schemas.openxmlformats.org/presentationml/2006/main">
+  <p:cSld>
+    <p:spTree>
+      <p:nvGrpSpPr>
+        <p:cNvPr id="1" name=""/>
+        <p:cNvGrpSpPr/>
+        <p:nvPr/>
+      </p:nvGrpSpPr>
+      <p:grpSpPr>
+        <a:xfrm>
+          <a:off x="0" y="0"/>
+          <a:ext cx="0" cy="0"/>
+          <a:chOff x="0" y="0"/>
+          <a:chExt cx="0" cy="0"/>
+        </a:xfrm>
+      </p:grpSpPr>
+      <p:sp>
+        <p:nvSpPr>
+          <p:cNvPr id="2" name="Título 1">
+            <a:extLst>
+              <a:ext uri="{FF2B5EF4-FFF2-40B4-BE49-F238E27FC236}">
+                <a16:creationId xmlns:a16="http://schemas.microsoft.com/office/drawing/2014/main" id="{5D41A5CF-35E0-4139-8E6C-1EA5644FC5A5}"/>
+              </a:ext>
+            </a:extLst>
+          </p:cNvPr>
+          <p:cNvSpPr>
+            <a:spLocks noGrp="1"/>
+          </p:cNvSpPr>
+          <p:nvPr>
+            <p:ph type="title"/>
+          </p:nvPr>
+        </p:nvSpPr>
+        <p:spPr/>
+        <p:txBody>
+          <a:bodyPr/>
+          <a:lstStyle/>
+          <a:p>
+            <a:endParaRPr lang="pt-BR"/>
+          </a:p>
+        </p:txBody>
+      </p:sp>
+      <p:pic>
+        <p:nvPicPr>
+          <p:cNvPr id="5" name="Espaço Reservado para Conteúdo 4" descr="Uma imagem contendo Texto&#10;&#10;Descrição gerada automaticamente">
+            <a:extLst>
+              <a:ext uri="{FF2B5EF4-FFF2-40B4-BE49-F238E27FC236}">
+                <a16:creationId xmlns:a16="http://schemas.microsoft.com/office/drawing/2014/main" id="{B72C02ED-851D-454B-8CF8-A4E978EA2D98}"/>
+              </a:ext>
+            </a:extLst>
+          </p:cNvPr>
+          <p:cNvPicPr>
+            <a:picLocks noGrp="1" noChangeAspect="1"/>
+          </p:cNvPicPr>
+          <p:nvPr>
+            <p:ph idx="1"/>
+          </p:nvPr>
+        </p:nvPicPr>
+        <p:blipFill>
+          <a:blip r:embed="rId2">
+            <a:extLst>
+              <a:ext uri="{28A0092B-C50C-407E-A947-70E740481C1C}">
+                <a14:useLocalDpi xmlns:a14="http://schemas.microsoft.com/office/drawing/2010/main" val="0"/>
+              </a:ext>
+            </a:extLst>
+          </a:blip>
+          <a:stretch>
+            <a:fillRect/>
+          </a:stretch>
+        </p:blipFill>
+        <p:spPr>
+          <a:xfrm>
+            <a:off x="0" y="0"/>
+            <a:ext cx="12192000" cy="6858000"/>
+          </a:xfrm>
+        </p:spPr>
+      </p:pic>
+    </p:spTree>
+    <p:extLst>
+      <p:ext uri="{BB962C8B-B14F-4D97-AF65-F5344CB8AC3E}">
+        <p14:creationId xmlns:p14="http://schemas.microsoft.com/office/powerpoint/2010/main" val="4101122860"/>
+      </p:ext>
+    </p:extLst>
+  </p:cSld>
+  <p:clrMapOvr>
+    <a:masterClrMapping/>
+  </p:clrMapOvr>
+</p:sld>
+</file>
+
+<file path=ppt/slides/slide18.xml><?xml version="1.0" encoding="utf-8"?>
+<p:sld xmlns:a="http://schemas.openxmlformats.org/drawingml/2006/main" xmlns:r="http://schemas.openxmlformats.org/officeDocument/2006/relationships" xmlns:p="http://schemas.openxmlformats.org/presentationml/2006/main">
+  <p:cSld>
+    <p:spTree>
+      <p:nvGrpSpPr>
+        <p:cNvPr id="1" name=""/>
+        <p:cNvGrpSpPr/>
+        <p:nvPr/>
+      </p:nvGrpSpPr>
+      <p:grpSpPr>
+        <a:xfrm>
+          <a:off x="0" y="0"/>
+          <a:ext cx="0" cy="0"/>
+          <a:chOff x="0" y="0"/>
+          <a:chExt cx="0" cy="0"/>
+        </a:xfrm>
+      </p:grpSpPr>
+      <p:sp>
+        <p:nvSpPr>
+          <p:cNvPr id="2" name="Título 1">
+            <a:extLst>
+              <a:ext uri="{FF2B5EF4-FFF2-40B4-BE49-F238E27FC236}">
                 <a16:creationId xmlns:a16="http://schemas.microsoft.com/office/drawing/2014/main" id="{58438501-AC6E-4598-8AAC-B4267FE742EC}"/>
               </a:ext>
             </a:extLst>
@@ -4102,31 +4432,41 @@
           </a:p>
         </p:txBody>
       </p:sp>
-      <p:sp>
-        <p:nvSpPr>
-          <p:cNvPr id="3" name="Espaço Reservado para Conteúdo 2">
-            <a:extLst>
-              <a:ext uri="{FF2B5EF4-FFF2-40B4-BE49-F238E27FC236}">
-                <a16:creationId xmlns:a16="http://schemas.microsoft.com/office/drawing/2014/main" id="{4D96A26E-FD52-41DC-B049-2B09AB2D766C}"/>
-              </a:ext>
-            </a:extLst>
-          </p:cNvPr>
-          <p:cNvSpPr>
-            <a:spLocks noGrp="1"/>
-          </p:cNvSpPr>
+      <p:pic>
+        <p:nvPicPr>
+          <p:cNvPr id="5" name="Espaço Reservado para Conteúdo 4" descr="Gráfico, Diagrama, Gráfico de bolhas&#10;&#10;Descrição gerada automaticamente">
+            <a:extLst>
+              <a:ext uri="{FF2B5EF4-FFF2-40B4-BE49-F238E27FC236}">
+                <a16:creationId xmlns:a16="http://schemas.microsoft.com/office/drawing/2014/main" id="{B5A1148A-FCB7-418F-B294-0A0ACC982FC0}"/>
+              </a:ext>
+            </a:extLst>
+          </p:cNvPr>
+          <p:cNvPicPr>
+            <a:picLocks noGrp="1" noChangeAspect="1"/>
+          </p:cNvPicPr>
           <p:nvPr>
             <p:ph idx="1"/>
           </p:nvPr>
-        </p:nvSpPr>
-        <p:spPr/>
-        <p:txBody>
-          <a:bodyPr/>
-          <a:lstStyle/>
-          <a:p>
-            <a:endParaRPr lang="pt-BR"/>
-          </a:p>
-        </p:txBody>
-      </p:sp>
+        </p:nvPicPr>
+        <p:blipFill>
+          <a:blip r:embed="rId2">
+            <a:extLst>
+              <a:ext uri="{28A0092B-C50C-407E-A947-70E740481C1C}">
+                <a14:useLocalDpi xmlns:a14="http://schemas.microsoft.com/office/drawing/2010/main" val="0"/>
+              </a:ext>
+            </a:extLst>
+          </a:blip>
+          <a:stretch>
+            <a:fillRect/>
+          </a:stretch>
+        </p:blipFill>
+        <p:spPr>
+          <a:xfrm>
+            <a:off x="0" y="0"/>
+            <a:ext cx="12192000" cy="6858000"/>
+          </a:xfrm>
+        </p:spPr>
+      </p:pic>
     </p:spTree>
     <p:extLst>
       <p:ext uri="{BB962C8B-B14F-4D97-AF65-F5344CB8AC3E}">
@@ -4162,7 +4502,7 @@
           <p:cNvPr id="2" name="Título 1">
             <a:extLst>
               <a:ext uri="{FF2B5EF4-FFF2-40B4-BE49-F238E27FC236}">
-                <a16:creationId xmlns:a16="http://schemas.microsoft.com/office/drawing/2014/main" id="{33AE994B-7BBB-4392-A8F1-BEDFF6364513}"/>
+                <a16:creationId xmlns:a16="http://schemas.microsoft.com/office/drawing/2014/main" id="{C89B9717-C803-4690-AB61-4239F673604C}"/>
               </a:ext>
             </a:extLst>
           </p:cNvPr>
@@ -4184,10 +4524,10 @@
       </p:sp>
       <p:pic>
         <p:nvPicPr>
-          <p:cNvPr id="5" name="Espaço Reservado para Conteúdo 4" descr="Uma imagem contendo Interface gráfica do usuário&#10;&#10;Descrição gerada automaticamente">
-            <a:extLst>
-              <a:ext uri="{FF2B5EF4-FFF2-40B4-BE49-F238E27FC236}">
-                <a16:creationId xmlns:a16="http://schemas.microsoft.com/office/drawing/2014/main" id="{09397F5C-36DA-4528-B977-FF38804EEF4F}"/>
+          <p:cNvPr id="5" name="Espaço Reservado para Conteúdo 4" descr="Interface gráfica do usuário, Linha do tempo&#10;&#10;Descrição gerada automaticamente">
+            <a:extLst>
+              <a:ext uri="{FF2B5EF4-FFF2-40B4-BE49-F238E27FC236}">
+                <a16:creationId xmlns:a16="http://schemas.microsoft.com/office/drawing/2014/main" id="{14AB6206-FC67-4029-A215-82FDCA144D1B}"/>
               </a:ext>
             </a:extLst>
           </p:cNvPr>
@@ -4212,15 +4552,18 @@
         </p:blipFill>
         <p:spPr>
           <a:xfrm>
-            <a:off x="-1" y="-157920"/>
-            <a:ext cx="12472747" cy="7015920"/>
-          </a:xfrm>
+            <a:off x="0" y="-54591"/>
+            <a:ext cx="12192000" cy="6858000"/>
+          </a:xfrm>
+          <a:solidFill>
+            <a:srgbClr val="FFCAAF"/>
+          </a:solidFill>
         </p:spPr>
       </p:pic>
     </p:spTree>
     <p:extLst>
       <p:ext uri="{BB962C8B-B14F-4D97-AF65-F5344CB8AC3E}">
-        <p14:creationId xmlns:p14="http://schemas.microsoft.com/office/powerpoint/2010/main" val="3971208035"/>
+        <p14:creationId xmlns:p14="http://schemas.microsoft.com/office/powerpoint/2010/main" val="1924270032"/>
       </p:ext>
     </p:extLst>
   </p:cSld>
@@ -4247,46 +4590,19 @@
           <a:chExt cx="0" cy="0"/>
         </a:xfrm>
       </p:grpSpPr>
-      <p:sp>
-        <p:nvSpPr>
-          <p:cNvPr id="2" name="Título 1">
-            <a:extLst>
-              <a:ext uri="{FF2B5EF4-FFF2-40B4-BE49-F238E27FC236}">
-                <a16:creationId xmlns:a16="http://schemas.microsoft.com/office/drawing/2014/main" id="{C89B9717-C803-4690-AB61-4239F673604C}"/>
-              </a:ext>
-            </a:extLst>
-          </p:cNvPr>
-          <p:cNvSpPr>
-            <a:spLocks noGrp="1"/>
-          </p:cNvSpPr>
-          <p:nvPr>
-            <p:ph type="title"/>
-          </p:nvPr>
-        </p:nvSpPr>
-        <p:spPr/>
-        <p:txBody>
-          <a:bodyPr/>
-          <a:lstStyle/>
-          <a:p>
-            <a:endParaRPr lang="pt-BR"/>
-          </a:p>
-        </p:txBody>
-      </p:sp>
       <p:pic>
         <p:nvPicPr>
-          <p:cNvPr id="5" name="Espaço Reservado para Conteúdo 4" descr="Interface gráfica do usuário, Linha do tempo&#10;&#10;Descrição gerada automaticamente">
-            <a:extLst>
-              <a:ext uri="{FF2B5EF4-FFF2-40B4-BE49-F238E27FC236}">
-                <a16:creationId xmlns:a16="http://schemas.microsoft.com/office/drawing/2014/main" id="{14AB6206-FC67-4029-A215-82FDCA144D1B}"/>
+          <p:cNvPr id="4" name="Imagem 3" descr="Uma imagem contendo Interface gráfica do usuário&#10;&#10;Descrição gerada automaticamente">
+            <a:extLst>
+              <a:ext uri="{FF2B5EF4-FFF2-40B4-BE49-F238E27FC236}">
+                <a16:creationId xmlns:a16="http://schemas.microsoft.com/office/drawing/2014/main" id="{B3E6C66B-CCC5-43A6-8F5B-8D8E93332CA3}"/>
               </a:ext>
             </a:extLst>
           </p:cNvPr>
           <p:cNvPicPr>
-            <a:picLocks noGrp="1" noChangeAspect="1"/>
+            <a:picLocks noChangeAspect="1"/>
           </p:cNvPicPr>
-          <p:nvPr>
-            <p:ph idx="1"/>
-          </p:nvPr>
+          <p:nvPr/>
         </p:nvPicPr>
         <p:blipFill>
           <a:blip r:embed="rId2">
@@ -4302,18 +4618,18 @@
         </p:blipFill>
         <p:spPr>
           <a:xfrm>
-            <a:off x="0" y="-54591"/>
+            <a:off x="0" y="0"/>
             <a:ext cx="12192000" cy="6858000"/>
           </a:xfrm>
-          <a:solidFill>
-            <a:srgbClr val="FFCAAF"/>
-          </a:solidFill>
+          <a:prstGeom prst="rect">
+            <a:avLst/>
+          </a:prstGeom>
         </p:spPr>
       </p:pic>
     </p:spTree>
     <p:extLst>
       <p:ext uri="{BB962C8B-B14F-4D97-AF65-F5344CB8AC3E}">
-        <p14:creationId xmlns:p14="http://schemas.microsoft.com/office/powerpoint/2010/main" val="1924270032"/>
+        <p14:creationId xmlns:p14="http://schemas.microsoft.com/office/powerpoint/2010/main" val="3971208035"/>
       </p:ext>
     </p:extLst>
   </p:cSld>
@@ -5708,6 +6024,760 @@
           </a:p>
         </p:txBody>
       </p:sp>
+      <p:sp>
+        <p:nvSpPr>
+          <p:cNvPr id="5" name="Fluxograma: Conector 4">
+            <a:extLst>
+              <a:ext uri="{FF2B5EF4-FFF2-40B4-BE49-F238E27FC236}">
+                <a16:creationId xmlns:a16="http://schemas.microsoft.com/office/drawing/2014/main" id="{561EA007-F081-45DE-9ECD-4959939838A7}"/>
+              </a:ext>
+            </a:extLst>
+          </p:cNvPr>
+          <p:cNvSpPr/>
+          <p:nvPr/>
+        </p:nvSpPr>
+        <p:spPr>
+          <a:xfrm>
+            <a:off x="607877" y="3166126"/>
+            <a:ext cx="198782" cy="189748"/>
+          </a:xfrm>
+          <a:prstGeom prst="flowChartConnector">
+            <a:avLst/>
+          </a:prstGeom>
+        </p:spPr>
+        <p:style>
+          <a:lnRef idx="2">
+            <a:schemeClr val="accent1">
+              <a:shade val="50000"/>
+            </a:schemeClr>
+          </a:lnRef>
+          <a:fillRef idx="1">
+            <a:schemeClr val="accent1"/>
+          </a:fillRef>
+          <a:effectRef idx="0">
+            <a:schemeClr val="accent1"/>
+          </a:effectRef>
+          <a:fontRef idx="minor">
+            <a:schemeClr val="lt1"/>
+          </a:fontRef>
+        </p:style>
+        <p:txBody>
+          <a:bodyPr rtlCol="0" anchor="ctr"/>
+          <a:lstStyle/>
+          <a:p>
+            <a:pPr algn="ctr"/>
+            <a:endParaRPr lang="pt-BR"/>
+          </a:p>
+        </p:txBody>
+      </p:sp>
+      <p:sp>
+        <p:nvSpPr>
+          <p:cNvPr id="6" name="Fluxograma: Conector 5">
+            <a:extLst>
+              <a:ext uri="{FF2B5EF4-FFF2-40B4-BE49-F238E27FC236}">
+                <a16:creationId xmlns:a16="http://schemas.microsoft.com/office/drawing/2014/main" id="{1BD5176C-76B3-4B43-8055-13F0F784A7A1}"/>
+              </a:ext>
+            </a:extLst>
+          </p:cNvPr>
+          <p:cNvSpPr/>
+          <p:nvPr/>
+        </p:nvSpPr>
+        <p:spPr>
+          <a:xfrm>
+            <a:off x="9008465" y="4771402"/>
+            <a:ext cx="198782" cy="189748"/>
+          </a:xfrm>
+          <a:prstGeom prst="flowChartConnector">
+            <a:avLst/>
+          </a:prstGeom>
+        </p:spPr>
+        <p:style>
+          <a:lnRef idx="2">
+            <a:schemeClr val="accent1">
+              <a:shade val="50000"/>
+            </a:schemeClr>
+          </a:lnRef>
+          <a:fillRef idx="1">
+            <a:schemeClr val="accent1"/>
+          </a:fillRef>
+          <a:effectRef idx="0">
+            <a:schemeClr val="accent1"/>
+          </a:effectRef>
+          <a:fontRef idx="minor">
+            <a:schemeClr val="lt1"/>
+          </a:fontRef>
+        </p:style>
+        <p:txBody>
+          <a:bodyPr rtlCol="0" anchor="ctr"/>
+          <a:lstStyle/>
+          <a:p>
+            <a:pPr algn="ctr"/>
+            <a:endParaRPr lang="pt-BR"/>
+          </a:p>
+        </p:txBody>
+      </p:sp>
+      <p:sp>
+        <p:nvSpPr>
+          <p:cNvPr id="7" name="CaixaDeTexto 6">
+            <a:extLst>
+              <a:ext uri="{FF2B5EF4-FFF2-40B4-BE49-F238E27FC236}">
+                <a16:creationId xmlns:a16="http://schemas.microsoft.com/office/drawing/2014/main" id="{53F9102E-9543-4055-863F-7F3BD97D6BB5}"/>
+              </a:ext>
+            </a:extLst>
+          </p:cNvPr>
+          <p:cNvSpPr txBox="1"/>
+          <p:nvPr/>
+        </p:nvSpPr>
+        <p:spPr>
+          <a:xfrm flipH="1">
+            <a:off x="8598200" y="4457893"/>
+            <a:ext cx="987951" cy="307777"/>
+          </a:xfrm>
+          <a:prstGeom prst="rect">
+            <a:avLst/>
+          </a:prstGeom>
+          <a:noFill/>
+        </p:spPr>
+        <p:txBody>
+          <a:bodyPr wrap="square" rtlCol="0">
+            <a:spAutoFit/>
+          </a:bodyPr>
+          <a:lstStyle/>
+          <a:p>
+            <a:pPr algn="ctr"/>
+            <a:r>
+              <a:rPr lang="pt-BR" sz="1400" b="1" dirty="0"/>
+              <a:t>30/11</a:t>
+            </a:r>
+          </a:p>
+        </p:txBody>
+      </p:sp>
+      <p:sp>
+        <p:nvSpPr>
+          <p:cNvPr id="10" name="CaixaDeTexto 9">
+            <a:extLst>
+              <a:ext uri="{FF2B5EF4-FFF2-40B4-BE49-F238E27FC236}">
+                <a16:creationId xmlns:a16="http://schemas.microsoft.com/office/drawing/2014/main" id="{613AB8C4-5D25-44AB-B264-DD0CBB2B303B}"/>
+              </a:ext>
+            </a:extLst>
+          </p:cNvPr>
+          <p:cNvSpPr txBox="1"/>
+          <p:nvPr/>
+        </p:nvSpPr>
+        <p:spPr>
+          <a:xfrm flipH="1">
+            <a:off x="8283565" y="4974402"/>
+            <a:ext cx="1652567" cy="307777"/>
+          </a:xfrm>
+          <a:prstGeom prst="rect">
+            <a:avLst/>
+          </a:prstGeom>
+          <a:noFill/>
+        </p:spPr>
+        <p:txBody>
+          <a:bodyPr wrap="square" rtlCol="0">
+            <a:spAutoFit/>
+          </a:bodyPr>
+          <a:lstStyle/>
+          <a:p>
+            <a:pPr algn="ctr"/>
+            <a:r>
+              <a:rPr lang="pt-BR" sz="1400" b="1" dirty="0"/>
+              <a:t>Projeto finalizado</a:t>
+            </a:r>
+          </a:p>
+        </p:txBody>
+      </p:sp>
+      <p:sp>
+        <p:nvSpPr>
+          <p:cNvPr id="12" name="CaixaDeTexto 11">
+            <a:extLst>
+              <a:ext uri="{FF2B5EF4-FFF2-40B4-BE49-F238E27FC236}">
+                <a16:creationId xmlns:a16="http://schemas.microsoft.com/office/drawing/2014/main" id="{83667FAA-DBBB-496D-BC3C-692DDE8B8FAB}"/>
+              </a:ext>
+            </a:extLst>
+          </p:cNvPr>
+          <p:cNvSpPr txBox="1"/>
+          <p:nvPr/>
+        </p:nvSpPr>
+        <p:spPr>
+          <a:xfrm flipH="1">
+            <a:off x="240464" y="2880874"/>
+            <a:ext cx="987951" cy="307777"/>
+          </a:xfrm>
+          <a:prstGeom prst="rect">
+            <a:avLst/>
+          </a:prstGeom>
+          <a:noFill/>
+        </p:spPr>
+        <p:txBody>
+          <a:bodyPr wrap="square" rtlCol="0">
+            <a:spAutoFit/>
+          </a:bodyPr>
+          <a:lstStyle/>
+          <a:p>
+            <a:pPr algn="ctr"/>
+            <a:r>
+              <a:rPr lang="pt-BR" sz="1400" b="1" dirty="0"/>
+              <a:t>02/11</a:t>
+            </a:r>
+          </a:p>
+        </p:txBody>
+      </p:sp>
+      <p:sp>
+        <p:nvSpPr>
+          <p:cNvPr id="15" name="CaixaDeTexto 14">
+            <a:extLst>
+              <a:ext uri="{FF2B5EF4-FFF2-40B4-BE49-F238E27FC236}">
+                <a16:creationId xmlns:a16="http://schemas.microsoft.com/office/drawing/2014/main" id="{EBD6C609-B320-42AD-9B47-31CEB5C26E4B}"/>
+              </a:ext>
+            </a:extLst>
+          </p:cNvPr>
+          <p:cNvSpPr txBox="1"/>
+          <p:nvPr/>
+        </p:nvSpPr>
+        <p:spPr>
+          <a:xfrm flipH="1">
+            <a:off x="-19625" y="3414627"/>
+            <a:ext cx="1652567" cy="523220"/>
+          </a:xfrm>
+          <a:prstGeom prst="rect">
+            <a:avLst/>
+          </a:prstGeom>
+          <a:noFill/>
+        </p:spPr>
+        <p:txBody>
+          <a:bodyPr wrap="square" rtlCol="0">
+            <a:spAutoFit/>
+          </a:bodyPr>
+          <a:lstStyle/>
+          <a:p>
+            <a:pPr algn="ctr"/>
+            <a:r>
+              <a:rPr lang="pt-BR" sz="1400" b="1" dirty="0"/>
+              <a:t>Integração com a assistente virtual</a:t>
+            </a:r>
+          </a:p>
+        </p:txBody>
+      </p:sp>
+      <p:sp>
+        <p:nvSpPr>
+          <p:cNvPr id="16" name="Fluxograma: Conector 15">
+            <a:extLst>
+              <a:ext uri="{FF2B5EF4-FFF2-40B4-BE49-F238E27FC236}">
+                <a16:creationId xmlns:a16="http://schemas.microsoft.com/office/drawing/2014/main" id="{CC1B4366-E4FE-48C9-89A0-0B456BB131D5}"/>
+              </a:ext>
+            </a:extLst>
+          </p:cNvPr>
+          <p:cNvSpPr/>
+          <p:nvPr/>
+        </p:nvSpPr>
+        <p:spPr>
+          <a:xfrm>
+            <a:off x="2549445" y="3319753"/>
+            <a:ext cx="198782" cy="189748"/>
+          </a:xfrm>
+          <a:prstGeom prst="flowChartConnector">
+            <a:avLst/>
+          </a:prstGeom>
+        </p:spPr>
+        <p:style>
+          <a:lnRef idx="2">
+            <a:schemeClr val="accent1">
+              <a:shade val="50000"/>
+            </a:schemeClr>
+          </a:lnRef>
+          <a:fillRef idx="1">
+            <a:schemeClr val="accent1"/>
+          </a:fillRef>
+          <a:effectRef idx="0">
+            <a:schemeClr val="accent1"/>
+          </a:effectRef>
+          <a:fontRef idx="minor">
+            <a:schemeClr val="lt1"/>
+          </a:fontRef>
+        </p:style>
+        <p:txBody>
+          <a:bodyPr rtlCol="0" anchor="ctr"/>
+          <a:lstStyle/>
+          <a:p>
+            <a:pPr algn="ctr"/>
+            <a:endParaRPr lang="pt-BR"/>
+          </a:p>
+        </p:txBody>
+      </p:sp>
+      <p:sp>
+        <p:nvSpPr>
+          <p:cNvPr id="17" name="CaixaDeTexto 16">
+            <a:extLst>
+              <a:ext uri="{FF2B5EF4-FFF2-40B4-BE49-F238E27FC236}">
+                <a16:creationId xmlns:a16="http://schemas.microsoft.com/office/drawing/2014/main" id="{A05A8DBE-F7FF-429B-B601-4B3DCD9841DF}"/>
+              </a:ext>
+            </a:extLst>
+          </p:cNvPr>
+          <p:cNvSpPr txBox="1"/>
+          <p:nvPr/>
+        </p:nvSpPr>
+        <p:spPr>
+          <a:xfrm flipH="1">
+            <a:off x="2129260" y="3011976"/>
+            <a:ext cx="987951" cy="307777"/>
+          </a:xfrm>
+          <a:prstGeom prst="rect">
+            <a:avLst/>
+          </a:prstGeom>
+          <a:noFill/>
+        </p:spPr>
+        <p:txBody>
+          <a:bodyPr wrap="square" rtlCol="0">
+            <a:spAutoFit/>
+          </a:bodyPr>
+          <a:lstStyle/>
+          <a:p>
+            <a:pPr algn="ctr"/>
+            <a:r>
+              <a:rPr lang="pt-BR" sz="1400" b="1" dirty="0"/>
+              <a:t>09/11</a:t>
+            </a:r>
+          </a:p>
+        </p:txBody>
+      </p:sp>
+      <p:sp>
+        <p:nvSpPr>
+          <p:cNvPr id="19" name="CaixaDeTexto 18">
+            <a:extLst>
+              <a:ext uri="{FF2B5EF4-FFF2-40B4-BE49-F238E27FC236}">
+                <a16:creationId xmlns:a16="http://schemas.microsoft.com/office/drawing/2014/main" id="{248B1A91-A832-4FE1-A290-56E6A3F799DA}"/>
+              </a:ext>
+            </a:extLst>
+          </p:cNvPr>
+          <p:cNvSpPr txBox="1"/>
+          <p:nvPr/>
+        </p:nvSpPr>
+        <p:spPr>
+          <a:xfrm flipH="1">
+            <a:off x="2280996" y="3541475"/>
+            <a:ext cx="2069939" cy="738664"/>
+          </a:xfrm>
+          <a:prstGeom prst="rect">
+            <a:avLst/>
+          </a:prstGeom>
+          <a:noFill/>
+        </p:spPr>
+        <p:txBody>
+          <a:bodyPr wrap="square" rtlCol="0">
+            <a:spAutoFit/>
+          </a:bodyPr>
+          <a:lstStyle/>
+          <a:p>
+            <a:pPr algn="ctr"/>
+            <a:r>
+              <a:rPr lang="pt-BR" sz="1400" b="1" dirty="0"/>
+              <a:t>Integração das tela com as APIS e máscara de campos </a:t>
+            </a:r>
+          </a:p>
+        </p:txBody>
+      </p:sp>
+      <p:sp>
+        <p:nvSpPr>
+          <p:cNvPr id="20" name="Fluxograma: Conector 19">
+            <a:extLst>
+              <a:ext uri="{FF2B5EF4-FFF2-40B4-BE49-F238E27FC236}">
+                <a16:creationId xmlns:a16="http://schemas.microsoft.com/office/drawing/2014/main" id="{A3D57D2F-089B-4C57-8A40-A276A2EE4488}"/>
+              </a:ext>
+            </a:extLst>
+          </p:cNvPr>
+          <p:cNvSpPr/>
+          <p:nvPr/>
+        </p:nvSpPr>
+        <p:spPr>
+          <a:xfrm>
+            <a:off x="2895049" y="4757620"/>
+            <a:ext cx="198782" cy="189748"/>
+          </a:xfrm>
+          <a:prstGeom prst="flowChartConnector">
+            <a:avLst/>
+          </a:prstGeom>
+        </p:spPr>
+        <p:style>
+          <a:lnRef idx="2">
+            <a:schemeClr val="accent1">
+              <a:shade val="50000"/>
+            </a:schemeClr>
+          </a:lnRef>
+          <a:fillRef idx="1">
+            <a:schemeClr val="accent1"/>
+          </a:fillRef>
+          <a:effectRef idx="0">
+            <a:schemeClr val="accent1"/>
+          </a:effectRef>
+          <a:fontRef idx="minor">
+            <a:schemeClr val="lt1"/>
+          </a:fontRef>
+        </p:style>
+        <p:txBody>
+          <a:bodyPr rtlCol="0" anchor="ctr"/>
+          <a:lstStyle/>
+          <a:p>
+            <a:pPr algn="ctr"/>
+            <a:endParaRPr lang="pt-BR"/>
+          </a:p>
+        </p:txBody>
+      </p:sp>
+      <p:sp>
+        <p:nvSpPr>
+          <p:cNvPr id="22" name="CaixaDeTexto 21">
+            <a:extLst>
+              <a:ext uri="{FF2B5EF4-FFF2-40B4-BE49-F238E27FC236}">
+                <a16:creationId xmlns:a16="http://schemas.microsoft.com/office/drawing/2014/main" id="{C2D1870E-4F4C-4E8A-9AB1-534A93DB5AC2}"/>
+              </a:ext>
+            </a:extLst>
+          </p:cNvPr>
+          <p:cNvSpPr txBox="1"/>
+          <p:nvPr/>
+        </p:nvSpPr>
+        <p:spPr>
+          <a:xfrm flipH="1">
+            <a:off x="2769973" y="4866276"/>
+            <a:ext cx="1652567" cy="307777"/>
+          </a:xfrm>
+          <a:prstGeom prst="rect">
+            <a:avLst/>
+          </a:prstGeom>
+          <a:noFill/>
+        </p:spPr>
+        <p:txBody>
+          <a:bodyPr wrap="square" rtlCol="0">
+            <a:spAutoFit/>
+          </a:bodyPr>
+          <a:lstStyle/>
+          <a:p>
+            <a:pPr algn="ctr"/>
+            <a:r>
+              <a:rPr lang="pt-BR" sz="1400" b="1" dirty="0"/>
+              <a:t>Teste integrado</a:t>
+            </a:r>
+          </a:p>
+        </p:txBody>
+      </p:sp>
+      <p:sp>
+        <p:nvSpPr>
+          <p:cNvPr id="24" name="Fluxograma: Conector 23">
+            <a:extLst>
+              <a:ext uri="{FF2B5EF4-FFF2-40B4-BE49-F238E27FC236}">
+                <a16:creationId xmlns:a16="http://schemas.microsoft.com/office/drawing/2014/main" id="{1B45716D-3986-4EC9-B69F-A90065E182D3}"/>
+              </a:ext>
+            </a:extLst>
+          </p:cNvPr>
+          <p:cNvSpPr/>
+          <p:nvPr/>
+        </p:nvSpPr>
+        <p:spPr>
+          <a:xfrm>
+            <a:off x="4993813" y="3414627"/>
+            <a:ext cx="198782" cy="189748"/>
+          </a:xfrm>
+          <a:prstGeom prst="flowChartConnector">
+            <a:avLst/>
+          </a:prstGeom>
+        </p:spPr>
+        <p:style>
+          <a:lnRef idx="2">
+            <a:schemeClr val="accent1">
+              <a:shade val="50000"/>
+            </a:schemeClr>
+          </a:lnRef>
+          <a:fillRef idx="1">
+            <a:schemeClr val="accent1"/>
+          </a:fillRef>
+          <a:effectRef idx="0">
+            <a:schemeClr val="accent1"/>
+          </a:effectRef>
+          <a:fontRef idx="minor">
+            <a:schemeClr val="lt1"/>
+          </a:fontRef>
+        </p:style>
+        <p:txBody>
+          <a:bodyPr rtlCol="0" anchor="ctr"/>
+          <a:lstStyle/>
+          <a:p>
+            <a:pPr algn="ctr"/>
+            <a:endParaRPr lang="pt-BR"/>
+          </a:p>
+        </p:txBody>
+      </p:sp>
+      <p:sp>
+        <p:nvSpPr>
+          <p:cNvPr id="26" name="CaixaDeTexto 25">
+            <a:extLst>
+              <a:ext uri="{FF2B5EF4-FFF2-40B4-BE49-F238E27FC236}">
+                <a16:creationId xmlns:a16="http://schemas.microsoft.com/office/drawing/2014/main" id="{441BF66C-F8C9-4ED2-BF8D-FC21E9C7BA2A}"/>
+              </a:ext>
+            </a:extLst>
+          </p:cNvPr>
+          <p:cNvSpPr txBox="1"/>
+          <p:nvPr/>
+        </p:nvSpPr>
+        <p:spPr>
+          <a:xfrm flipH="1">
+            <a:off x="4822199" y="3665692"/>
+            <a:ext cx="2069939" cy="738664"/>
+          </a:xfrm>
+          <a:prstGeom prst="rect">
+            <a:avLst/>
+          </a:prstGeom>
+          <a:noFill/>
+        </p:spPr>
+        <p:txBody>
+          <a:bodyPr wrap="square" rtlCol="0">
+            <a:spAutoFit/>
+          </a:bodyPr>
+          <a:lstStyle/>
+          <a:p>
+            <a:pPr algn="ctr"/>
+            <a:r>
+              <a:rPr lang="pt-BR" sz="1400" b="1" dirty="0"/>
+              <a:t>Desenvolvimento de filtros de pesquisas com APIS</a:t>
+            </a:r>
+          </a:p>
+        </p:txBody>
+      </p:sp>
+      <p:sp>
+        <p:nvSpPr>
+          <p:cNvPr id="30" name="CaixaDeTexto 29">
+            <a:extLst>
+              <a:ext uri="{FF2B5EF4-FFF2-40B4-BE49-F238E27FC236}">
+                <a16:creationId xmlns:a16="http://schemas.microsoft.com/office/drawing/2014/main" id="{9E879EB4-8050-4771-A04D-D3EB685685D0}"/>
+              </a:ext>
+            </a:extLst>
+          </p:cNvPr>
+          <p:cNvSpPr txBox="1"/>
+          <p:nvPr/>
+        </p:nvSpPr>
+        <p:spPr>
+          <a:xfrm flipH="1">
+            <a:off x="4613882" y="2996795"/>
+            <a:ext cx="987951" cy="307777"/>
+          </a:xfrm>
+          <a:prstGeom prst="rect">
+            <a:avLst/>
+          </a:prstGeom>
+          <a:noFill/>
+        </p:spPr>
+        <p:txBody>
+          <a:bodyPr wrap="square" rtlCol="0">
+            <a:spAutoFit/>
+          </a:bodyPr>
+          <a:lstStyle/>
+          <a:p>
+            <a:pPr algn="ctr"/>
+            <a:r>
+              <a:rPr lang="pt-BR" sz="1400" b="1" dirty="0"/>
+              <a:t>16/11</a:t>
+            </a:r>
+          </a:p>
+        </p:txBody>
+      </p:sp>
+      <p:sp>
+        <p:nvSpPr>
+          <p:cNvPr id="32" name="Fluxograma: Conector 31">
+            <a:extLst>
+              <a:ext uri="{FF2B5EF4-FFF2-40B4-BE49-F238E27FC236}">
+                <a16:creationId xmlns:a16="http://schemas.microsoft.com/office/drawing/2014/main" id="{A4CC197F-4777-4AF7-928A-F99EAB272648}"/>
+              </a:ext>
+            </a:extLst>
+          </p:cNvPr>
+          <p:cNvSpPr/>
+          <p:nvPr/>
+        </p:nvSpPr>
+        <p:spPr>
+          <a:xfrm>
+            <a:off x="4942281" y="4925290"/>
+            <a:ext cx="198782" cy="189748"/>
+          </a:xfrm>
+          <a:prstGeom prst="flowChartConnector">
+            <a:avLst/>
+          </a:prstGeom>
+        </p:spPr>
+        <p:style>
+          <a:lnRef idx="2">
+            <a:schemeClr val="accent1">
+              <a:shade val="50000"/>
+            </a:schemeClr>
+          </a:lnRef>
+          <a:fillRef idx="1">
+            <a:schemeClr val="accent1"/>
+          </a:fillRef>
+          <a:effectRef idx="0">
+            <a:schemeClr val="accent1"/>
+          </a:effectRef>
+          <a:fontRef idx="minor">
+            <a:schemeClr val="lt1"/>
+          </a:fontRef>
+        </p:style>
+        <p:txBody>
+          <a:bodyPr rtlCol="0" anchor="ctr"/>
+          <a:lstStyle/>
+          <a:p>
+            <a:pPr algn="ctr"/>
+            <a:endParaRPr lang="pt-BR"/>
+          </a:p>
+        </p:txBody>
+      </p:sp>
+      <p:sp>
+        <p:nvSpPr>
+          <p:cNvPr id="64" name="CaixaDeTexto 63">
+            <a:extLst>
+              <a:ext uri="{FF2B5EF4-FFF2-40B4-BE49-F238E27FC236}">
+                <a16:creationId xmlns:a16="http://schemas.microsoft.com/office/drawing/2014/main" id="{5BEBFD0C-B210-40E8-885C-CDD7D3A1D5B6}"/>
+              </a:ext>
+            </a:extLst>
+          </p:cNvPr>
+          <p:cNvSpPr txBox="1"/>
+          <p:nvPr/>
+        </p:nvSpPr>
+        <p:spPr>
+          <a:xfrm flipH="1">
+            <a:off x="4720985" y="5122621"/>
+            <a:ext cx="1652567" cy="307777"/>
+          </a:xfrm>
+          <a:prstGeom prst="rect">
+            <a:avLst/>
+          </a:prstGeom>
+          <a:noFill/>
+        </p:spPr>
+        <p:txBody>
+          <a:bodyPr wrap="square" rtlCol="0">
+            <a:spAutoFit/>
+          </a:bodyPr>
+          <a:lstStyle/>
+          <a:p>
+            <a:pPr algn="ctr"/>
+            <a:r>
+              <a:rPr lang="pt-BR" sz="1400" b="1" dirty="0"/>
+              <a:t>Teste integrado</a:t>
+            </a:r>
+          </a:p>
+        </p:txBody>
+      </p:sp>
+      <p:sp>
+        <p:nvSpPr>
+          <p:cNvPr id="66" name="Fluxograma: Conector 65">
+            <a:extLst>
+              <a:ext uri="{FF2B5EF4-FFF2-40B4-BE49-F238E27FC236}">
+                <a16:creationId xmlns:a16="http://schemas.microsoft.com/office/drawing/2014/main" id="{4AB0A5FA-3663-4C5D-A4FB-24BE85E0B01D}"/>
+              </a:ext>
+            </a:extLst>
+          </p:cNvPr>
+          <p:cNvSpPr/>
+          <p:nvPr/>
+        </p:nvSpPr>
+        <p:spPr>
+          <a:xfrm>
+            <a:off x="7481101" y="3676237"/>
+            <a:ext cx="198782" cy="189748"/>
+          </a:xfrm>
+          <a:prstGeom prst="flowChartConnector">
+            <a:avLst/>
+          </a:prstGeom>
+        </p:spPr>
+        <p:style>
+          <a:lnRef idx="2">
+            <a:schemeClr val="accent1">
+              <a:shade val="50000"/>
+            </a:schemeClr>
+          </a:lnRef>
+          <a:fillRef idx="1">
+            <a:schemeClr val="accent1"/>
+          </a:fillRef>
+          <a:effectRef idx="0">
+            <a:schemeClr val="accent1"/>
+          </a:effectRef>
+          <a:fontRef idx="minor">
+            <a:schemeClr val="lt1"/>
+          </a:fontRef>
+        </p:style>
+        <p:txBody>
+          <a:bodyPr rtlCol="0" anchor="ctr"/>
+          <a:lstStyle/>
+          <a:p>
+            <a:pPr algn="ctr"/>
+            <a:endParaRPr lang="pt-BR"/>
+          </a:p>
+        </p:txBody>
+      </p:sp>
+      <p:sp>
+        <p:nvSpPr>
+          <p:cNvPr id="68" name="CaixaDeTexto 67">
+            <a:extLst>
+              <a:ext uri="{FF2B5EF4-FFF2-40B4-BE49-F238E27FC236}">
+                <a16:creationId xmlns:a16="http://schemas.microsoft.com/office/drawing/2014/main" id="{B4A52D5B-1E3D-46D4-AB46-6A81F960E920}"/>
+              </a:ext>
+            </a:extLst>
+          </p:cNvPr>
+          <p:cNvSpPr txBox="1"/>
+          <p:nvPr/>
+        </p:nvSpPr>
+        <p:spPr>
+          <a:xfrm flipH="1">
+            <a:off x="7155300" y="3856231"/>
+            <a:ext cx="1652567" cy="307777"/>
+          </a:xfrm>
+          <a:prstGeom prst="rect">
+            <a:avLst/>
+          </a:prstGeom>
+          <a:noFill/>
+        </p:spPr>
+        <p:txBody>
+          <a:bodyPr wrap="square" rtlCol="0">
+            <a:spAutoFit/>
+          </a:bodyPr>
+          <a:lstStyle/>
+          <a:p>
+            <a:pPr algn="ctr"/>
+            <a:r>
+              <a:rPr lang="pt-BR" sz="1400" b="1" dirty="0"/>
+              <a:t>Teste de aplicação</a:t>
+            </a:r>
+          </a:p>
+        </p:txBody>
+      </p:sp>
+      <p:sp>
+        <p:nvSpPr>
+          <p:cNvPr id="70" name="CaixaDeTexto 69">
+            <a:extLst>
+              <a:ext uri="{FF2B5EF4-FFF2-40B4-BE49-F238E27FC236}">
+                <a16:creationId xmlns:a16="http://schemas.microsoft.com/office/drawing/2014/main" id="{3DEA9876-44E1-45E9-976B-81310D9DF065}"/>
+              </a:ext>
+            </a:extLst>
+          </p:cNvPr>
+          <p:cNvSpPr txBox="1"/>
+          <p:nvPr/>
+        </p:nvSpPr>
+        <p:spPr>
+          <a:xfrm flipH="1">
+            <a:off x="7040449" y="3387586"/>
+            <a:ext cx="987951" cy="307777"/>
+          </a:xfrm>
+          <a:prstGeom prst="rect">
+            <a:avLst/>
+          </a:prstGeom>
+          <a:noFill/>
+        </p:spPr>
+        <p:txBody>
+          <a:bodyPr wrap="square" rtlCol="0">
+            <a:spAutoFit/>
+          </a:bodyPr>
+          <a:lstStyle/>
+          <a:p>
+            <a:pPr algn="ctr"/>
+            <a:r>
+              <a:rPr lang="pt-BR" sz="1400" b="1" dirty="0"/>
+              <a:t>30/11</a:t>
+            </a:r>
+          </a:p>
+        </p:txBody>
+      </p:sp>
     </p:spTree>
     <p:extLst>
       <p:ext uri="{BB962C8B-B14F-4D97-AF65-F5344CB8AC3E}">
@@ -5738,46 +6808,19 @@
           <a:chExt cx="0" cy="0"/>
         </a:xfrm>
       </p:grpSpPr>
-      <p:sp>
-        <p:nvSpPr>
-          <p:cNvPr id="2" name="Título 1">
-            <a:extLst>
-              <a:ext uri="{FF2B5EF4-FFF2-40B4-BE49-F238E27FC236}">
-                <a16:creationId xmlns:a16="http://schemas.microsoft.com/office/drawing/2014/main" id="{9C38580F-2434-4693-9F57-231E7626E7EB}"/>
-              </a:ext>
-            </a:extLst>
-          </p:cNvPr>
-          <p:cNvSpPr>
-            <a:spLocks noGrp="1"/>
-          </p:cNvSpPr>
-          <p:nvPr>
-            <p:ph type="title"/>
-          </p:nvPr>
-        </p:nvSpPr>
-        <p:spPr/>
-        <p:txBody>
-          <a:bodyPr/>
-          <a:lstStyle/>
-          <a:p>
-            <a:endParaRPr lang="pt-BR"/>
-          </a:p>
-        </p:txBody>
-      </p:sp>
       <p:pic>
         <p:nvPicPr>
-          <p:cNvPr id="5" name="Espaço Reservado para Conteúdo 4" descr="Uma imagem contendo Interface gráfica do usuário&#10;&#10;Descrição gerada automaticamente">
-            <a:extLst>
-              <a:ext uri="{FF2B5EF4-FFF2-40B4-BE49-F238E27FC236}">
-                <a16:creationId xmlns:a16="http://schemas.microsoft.com/office/drawing/2014/main" id="{D5B46759-960C-4859-B63E-5C1AC2D7A055}"/>
+          <p:cNvPr id="5" name="Imagem 4" descr="Uma imagem contendo Interface gráfica do usuário&#10;&#10;Descrição gerada automaticamente">
+            <a:extLst>
+              <a:ext uri="{FF2B5EF4-FFF2-40B4-BE49-F238E27FC236}">
+                <a16:creationId xmlns:a16="http://schemas.microsoft.com/office/drawing/2014/main" id="{3C6A94E4-D4D1-47EC-8151-983E98BACDC9}"/>
               </a:ext>
             </a:extLst>
           </p:cNvPr>
           <p:cNvPicPr>
-            <a:picLocks noGrp="1" noChangeAspect="1"/>
+            <a:picLocks noChangeAspect="1"/>
           </p:cNvPicPr>
-          <p:nvPr>
-            <p:ph idx="1"/>
-          </p:nvPr>
+          <p:nvPr/>
         </p:nvPicPr>
         <p:blipFill>
           <a:blip r:embed="rId2">
@@ -5796,39 +6839,6 @@
             <a:off x="0" y="0"/>
             <a:ext cx="12192000" cy="6858000"/>
           </a:xfrm>
-        </p:spPr>
-      </p:pic>
-      <p:pic>
-        <p:nvPicPr>
-          <p:cNvPr id="13" name="Imagem 12" descr="Texto&#10;&#10;Descrição gerada automaticamente">
-            <a:extLst>
-              <a:ext uri="{FF2B5EF4-FFF2-40B4-BE49-F238E27FC236}">
-                <a16:creationId xmlns:a16="http://schemas.microsoft.com/office/drawing/2014/main" id="{BCC372D5-1E9B-4779-8DC7-FBC308169AE0}"/>
-              </a:ext>
-            </a:extLst>
-          </p:cNvPr>
-          <p:cNvPicPr>
-            <a:picLocks noChangeAspect="1"/>
-          </p:cNvPicPr>
-          <p:nvPr/>
-        </p:nvPicPr>
-        <p:blipFill>
-          <a:blip r:embed="rId3">
-            <a:extLst>
-              <a:ext uri="{28A0092B-C50C-407E-A947-70E740481C1C}">
-                <a14:useLocalDpi xmlns:a14="http://schemas.microsoft.com/office/drawing/2010/main" val="0"/>
-              </a:ext>
-            </a:extLst>
-          </a:blip>
-          <a:stretch>
-            <a:fillRect/>
-          </a:stretch>
-        </p:blipFill>
-        <p:spPr>
-          <a:xfrm>
-            <a:off x="0" y="0"/>
-            <a:ext cx="12192000" cy="6858000"/>
-          </a:xfrm>
           <a:prstGeom prst="rect">
             <a:avLst/>
           </a:prstGeom>
@@ -5837,7 +6847,7 @@
     </p:spTree>
     <p:extLst>
       <p:ext uri="{BB962C8B-B14F-4D97-AF65-F5344CB8AC3E}">
-        <p14:creationId xmlns:p14="http://schemas.microsoft.com/office/powerpoint/2010/main" val="3636810027"/>
+        <p14:creationId xmlns:p14="http://schemas.microsoft.com/office/powerpoint/2010/main" val="405661128"/>
       </p:ext>
     </p:extLst>
   </p:cSld>
@@ -5864,46 +6874,19 @@
           <a:chExt cx="0" cy="0"/>
         </a:xfrm>
       </p:grpSpPr>
-      <p:sp>
-        <p:nvSpPr>
-          <p:cNvPr id="2" name="Título 1">
-            <a:extLst>
-              <a:ext uri="{FF2B5EF4-FFF2-40B4-BE49-F238E27FC236}">
-                <a16:creationId xmlns:a16="http://schemas.microsoft.com/office/drawing/2014/main" id="{A3F7511D-8ED9-43F3-A93C-9B17C731A801}"/>
-              </a:ext>
-            </a:extLst>
-          </p:cNvPr>
-          <p:cNvSpPr>
-            <a:spLocks noGrp="1"/>
-          </p:cNvSpPr>
-          <p:nvPr>
-            <p:ph type="title"/>
-          </p:nvPr>
-        </p:nvSpPr>
-        <p:spPr/>
-        <p:txBody>
-          <a:bodyPr/>
-          <a:lstStyle/>
-          <a:p>
-            <a:endParaRPr lang="pt-BR"/>
-          </a:p>
-        </p:txBody>
-      </p:sp>
       <p:pic>
         <p:nvPicPr>
-          <p:cNvPr id="23" name="Espaço Reservado para Conteúdo 22" descr="Uma imagem contendo Texto&#10;&#10;Descrição gerada automaticamente">
-            <a:extLst>
-              <a:ext uri="{FF2B5EF4-FFF2-40B4-BE49-F238E27FC236}">
-                <a16:creationId xmlns:a16="http://schemas.microsoft.com/office/drawing/2014/main" id="{06D6E60A-425D-4C49-9CC7-B6337D4597AC}"/>
+          <p:cNvPr id="13" name="Imagem 12" descr="Texto&#10;&#10;Descrição gerada automaticamente">
+            <a:extLst>
+              <a:ext uri="{FF2B5EF4-FFF2-40B4-BE49-F238E27FC236}">
+                <a16:creationId xmlns:a16="http://schemas.microsoft.com/office/drawing/2014/main" id="{BCC372D5-1E9B-4779-8DC7-FBC308169AE0}"/>
               </a:ext>
             </a:extLst>
           </p:cNvPr>
           <p:cNvPicPr>
-            <a:picLocks noGrp="1" noChangeAspect="1"/>
+            <a:picLocks noChangeAspect="1"/>
           </p:cNvPicPr>
-          <p:nvPr>
-            <p:ph idx="1"/>
-          </p:nvPr>
+          <p:nvPr/>
         </p:nvPicPr>
         <p:blipFill>
           <a:blip r:embed="rId2">
@@ -5919,17 +6902,20 @@
         </p:blipFill>
         <p:spPr>
           <a:xfrm>
-            <a:off x="167332" y="-122830"/>
-            <a:ext cx="12010030" cy="6755642"/>
-          </a:xfrm>
+            <a:off x="0" y="0"/>
+            <a:ext cx="12192000" cy="6858000"/>
+          </a:xfrm>
+          <a:prstGeom prst="rect">
+            <a:avLst/>
+          </a:prstGeom>
         </p:spPr>
       </p:pic>
       <p:pic>
         <p:nvPicPr>
-          <p:cNvPr id="25" name="Imagem 24" descr="Diagrama&#10;&#10;Descrição gerada automaticamente">
-            <a:extLst>
-              <a:ext uri="{FF2B5EF4-FFF2-40B4-BE49-F238E27FC236}">
-                <a16:creationId xmlns:a16="http://schemas.microsoft.com/office/drawing/2014/main" id="{B899FF5A-D2E9-4556-9B88-10D078685D57}"/>
+          <p:cNvPr id="9" name="Imagem 8">
+            <a:extLst>
+              <a:ext uri="{FF2B5EF4-FFF2-40B4-BE49-F238E27FC236}">
+                <a16:creationId xmlns:a16="http://schemas.microsoft.com/office/drawing/2014/main" id="{CA1CB5C5-B1FC-40CC-894B-0575E89465E4}"/>
               </a:ext>
             </a:extLst>
           </p:cNvPr>
@@ -5939,21 +6925,15 @@
           <p:nvPr/>
         </p:nvPicPr>
         <p:blipFill>
-          <a:blip r:embed="rId3">
-            <a:extLst>
-              <a:ext uri="{28A0092B-C50C-407E-A947-70E740481C1C}">
-                <a14:useLocalDpi xmlns:a14="http://schemas.microsoft.com/office/drawing/2010/main" val="0"/>
-              </a:ext>
-            </a:extLst>
-          </a:blip>
+          <a:blip r:embed="rId3"/>
           <a:stretch>
             <a:fillRect/>
           </a:stretch>
         </p:blipFill>
         <p:spPr>
           <a:xfrm>
-            <a:off x="2336194" y="1267201"/>
-            <a:ext cx="7519611" cy="5347279"/>
+            <a:off x="1603513" y="1273171"/>
+            <a:ext cx="7807607" cy="5213307"/>
           </a:xfrm>
           <a:prstGeom prst="rect">
             <a:avLst/>
@@ -5963,7 +6943,7 @@
     </p:spTree>
     <p:extLst>
       <p:ext uri="{BB962C8B-B14F-4D97-AF65-F5344CB8AC3E}">
-        <p14:creationId xmlns:p14="http://schemas.microsoft.com/office/powerpoint/2010/main" val="3814114143"/>
+        <p14:creationId xmlns:p14="http://schemas.microsoft.com/office/powerpoint/2010/main" val="3636810027"/>
       </p:ext>
     </p:extLst>
   </p:cSld>
@@ -5990,19 +6970,46 @@
           <a:chExt cx="0" cy="0"/>
         </a:xfrm>
       </p:grpSpPr>
+      <p:sp>
+        <p:nvSpPr>
+          <p:cNvPr id="2" name="Título 1">
+            <a:extLst>
+              <a:ext uri="{FF2B5EF4-FFF2-40B4-BE49-F238E27FC236}">
+                <a16:creationId xmlns:a16="http://schemas.microsoft.com/office/drawing/2014/main" id="{A3F7511D-8ED9-43F3-A93C-9B17C731A801}"/>
+              </a:ext>
+            </a:extLst>
+          </p:cNvPr>
+          <p:cNvSpPr>
+            <a:spLocks noGrp="1"/>
+          </p:cNvSpPr>
+          <p:nvPr>
+            <p:ph type="title"/>
+          </p:nvPr>
+        </p:nvSpPr>
+        <p:spPr/>
+        <p:txBody>
+          <a:bodyPr/>
+          <a:lstStyle/>
+          <a:p>
+            <a:endParaRPr lang="pt-BR"/>
+          </a:p>
+        </p:txBody>
+      </p:sp>
       <p:pic>
         <p:nvPicPr>
-          <p:cNvPr id="7" name="Imagem 6" descr="Uma imagem contendo Interface gráfica do usuário, Texto&#10;&#10;Descrição gerada automaticamente">
-            <a:extLst>
-              <a:ext uri="{FF2B5EF4-FFF2-40B4-BE49-F238E27FC236}">
-                <a16:creationId xmlns:a16="http://schemas.microsoft.com/office/drawing/2014/main" id="{64D6CDF5-ADD0-462D-9BA5-B1587E2E9E45}"/>
+          <p:cNvPr id="23" name="Espaço Reservado para Conteúdo 22" descr="Uma imagem contendo Texto&#10;&#10;Descrição gerada automaticamente">
+            <a:extLst>
+              <a:ext uri="{FF2B5EF4-FFF2-40B4-BE49-F238E27FC236}">
+                <a16:creationId xmlns:a16="http://schemas.microsoft.com/office/drawing/2014/main" id="{06D6E60A-425D-4C49-9CC7-B6337D4597AC}"/>
               </a:ext>
             </a:extLst>
           </p:cNvPr>
           <p:cNvPicPr>
-            <a:picLocks noChangeAspect="1"/>
+            <a:picLocks noGrp="1" noChangeAspect="1"/>
           </p:cNvPicPr>
-          <p:nvPr/>
+          <p:nvPr>
+            <p:ph idx="1"/>
+          </p:nvPr>
         </p:nvPicPr>
         <p:blipFill>
           <a:blip r:embed="rId2">
@@ -6018,20 +7025,17 @@
         </p:blipFill>
         <p:spPr>
           <a:xfrm>
-            <a:off x="0" y="-13648"/>
-            <a:ext cx="12192000" cy="6858000"/>
-          </a:xfrm>
-          <a:prstGeom prst="rect">
-            <a:avLst/>
-          </a:prstGeom>
+            <a:off x="167332" y="-122830"/>
+            <a:ext cx="12010030" cy="6755642"/>
+          </a:xfrm>
         </p:spPr>
       </p:pic>
       <p:pic>
         <p:nvPicPr>
-          <p:cNvPr id="11" name="Imagem 10" descr="Uma imagem contendo Texto&#10;&#10;Descrição gerada automaticamente">
-            <a:extLst>
-              <a:ext uri="{FF2B5EF4-FFF2-40B4-BE49-F238E27FC236}">
-                <a16:creationId xmlns:a16="http://schemas.microsoft.com/office/drawing/2014/main" id="{E844F4CC-29BE-4C27-81C5-B2B45A41B19F}"/>
+          <p:cNvPr id="4" name="Imagem 3" descr="Diagrama&#10;&#10;Descrição gerada automaticamente">
+            <a:extLst>
+              <a:ext uri="{FF2B5EF4-FFF2-40B4-BE49-F238E27FC236}">
+                <a16:creationId xmlns:a16="http://schemas.microsoft.com/office/drawing/2014/main" id="{9CCF0214-EC1C-45A5-BBC7-7A5BD5F217A1}"/>
               </a:ext>
             </a:extLst>
           </p:cNvPr>
@@ -6054,8 +7058,8 @@
         </p:blipFill>
         <p:spPr>
           <a:xfrm>
-            <a:off x="3248652" y="1299943"/>
-            <a:ext cx="5694695" cy="5462522"/>
+            <a:off x="1888232" y="679818"/>
+            <a:ext cx="8415536" cy="5498364"/>
           </a:xfrm>
           <a:prstGeom prst="rect">
             <a:avLst/>
@@ -6065,7 +7069,7 @@
     </p:spTree>
     <p:extLst>
       <p:ext uri="{BB962C8B-B14F-4D97-AF65-F5344CB8AC3E}">
-        <p14:creationId xmlns:p14="http://schemas.microsoft.com/office/powerpoint/2010/main" val="395785051"/>
+        <p14:creationId xmlns:p14="http://schemas.microsoft.com/office/powerpoint/2010/main" val="3814114143"/>
       </p:ext>
     </p:extLst>
   </p:cSld>

</xml_diff>